<commit_message>
changes made by rusha
</commit_message>
<xml_diff>
--- a/MovieMagic.pptx
+++ b/MovieMagic.pptx
@@ -13,12 +13,9 @@
     <p:sldId id="258" r:id="rId6"/>
     <p:sldId id="259" r:id="rId7"/>
     <p:sldId id="260" r:id="rId8"/>
-    <p:sldId id="261" r:id="rId9"/>
-    <p:sldId id="262" r:id="rId10"/>
-    <p:sldId id="263" r:id="rId11"/>
-    <p:sldId id="268" r:id="rId12"/>
-    <p:sldId id="264" r:id="rId13"/>
-    <p:sldId id="265" r:id="rId14"/>
+    <p:sldId id="268" r:id="rId9"/>
+    <p:sldId id="264" r:id="rId10"/>
+    <p:sldId id="265" r:id="rId11"/>
   </p:sldIdLst>
   <p:sldSz cx="9144000" cy="6858000" type="screen4x3"/>
   <p:notesSz cx="6858000" cy="9144000"/>
@@ -5769,298 +5766,6 @@
 </p:sld>
 </file>
 
-<file path=ppt/slides/slide10.xml><?xml version="1.0" encoding="utf-8"?>
-<p:sld xmlns:a="http://schemas.openxmlformats.org/drawingml/2006/main" xmlns:r="http://schemas.openxmlformats.org/officeDocument/2006/relationships" xmlns:p="http://schemas.openxmlformats.org/presentationml/2006/main">
-  <p:cSld>
-    <p:spTree>
-      <p:nvGrpSpPr>
-        <p:cNvPr id="1" name=""/>
-        <p:cNvGrpSpPr/>
-        <p:nvPr/>
-      </p:nvGrpSpPr>
-      <p:grpSpPr>
-        <a:xfrm>
-          <a:off x="0" y="0"/>
-          <a:ext cx="0" cy="0"/>
-          <a:chOff x="0" y="0"/>
-          <a:chExt cx="0" cy="0"/>
-        </a:xfrm>
-      </p:grpSpPr>
-      <p:sp>
-        <p:nvSpPr>
-          <p:cNvPr id="2" name="Title 1"/>
-          <p:cNvSpPr>
-            <a:spLocks noGrp="1"/>
-          </p:cNvSpPr>
-          <p:nvPr>
-            <p:ph type="title"/>
-          </p:nvPr>
-        </p:nvSpPr>
-        <p:spPr/>
-        <p:txBody>
-          <a:bodyPr/>
-          <a:lstStyle/>
-          <a:p>
-            <a:r>
-              <a:rPr lang="en-US" dirty="0">
-                <a:solidFill>
-                  <a:schemeClr val="tx1"/>
-                </a:solidFill>
-                <a:latin typeface="Times New Roman" panose="02020603050405020304" charset="0"/>
-                <a:cs typeface="Times New Roman" panose="02020603050405020304" charset="0"/>
-              </a:rPr>
-              <a:t>Future Work</a:t>
-            </a:r>
-            <a:endParaRPr lang="en-US" dirty="0">
-              <a:solidFill>
-                <a:schemeClr val="tx1"/>
-              </a:solidFill>
-              <a:latin typeface="Times New Roman" panose="02020603050405020304" charset="0"/>
-              <a:cs typeface="Times New Roman" panose="02020603050405020304" charset="0"/>
-            </a:endParaRPr>
-          </a:p>
-        </p:txBody>
-      </p:sp>
-      <p:sp>
-        <p:nvSpPr>
-          <p:cNvPr id="3" name="Content Placeholder 2"/>
-          <p:cNvSpPr>
-            <a:spLocks noGrp="1"/>
-          </p:cNvSpPr>
-          <p:nvPr>
-            <p:ph sz="quarter" idx="1"/>
-          </p:nvPr>
-        </p:nvSpPr>
-        <p:spPr/>
-        <p:txBody>
-          <a:bodyPr/>
-          <a:lstStyle/>
-          <a:p>
-            <a:r>
-              <a:rPr lang="en-US" dirty="0">
-                <a:latin typeface="Times New Roman" panose="02020603050405020304" charset="0"/>
-                <a:cs typeface="Times New Roman" panose="02020603050405020304" charset="0"/>
-              </a:rPr>
-              <a:t>Review Page</a:t>
-            </a:r>
-            <a:endParaRPr lang="en-US" dirty="0">
-              <a:latin typeface="Times New Roman" panose="02020603050405020304" charset="0"/>
-              <a:cs typeface="Times New Roman" panose="02020603050405020304" charset="0"/>
-            </a:endParaRPr>
-          </a:p>
-          <a:p>
-            <a:r>
-              <a:rPr lang="en-US" dirty="0">
-                <a:latin typeface="Times New Roman" panose="02020603050405020304" charset="0"/>
-                <a:cs typeface="Times New Roman" panose="02020603050405020304" charset="0"/>
-              </a:rPr>
-              <a:t>Video Playing Page</a:t>
-            </a:r>
-            <a:endParaRPr lang="en-US" dirty="0">
-              <a:latin typeface="Times New Roman" panose="02020603050405020304" charset="0"/>
-              <a:cs typeface="Times New Roman" panose="02020603050405020304" charset="0"/>
-            </a:endParaRPr>
-          </a:p>
-          <a:p>
-            <a:r>
-              <a:rPr lang="en-US" dirty="0">
-                <a:latin typeface="Times New Roman" panose="02020603050405020304" charset="0"/>
-                <a:cs typeface="Times New Roman" panose="02020603050405020304" charset="0"/>
-              </a:rPr>
-              <a:t>Personal Recommendations</a:t>
-            </a:r>
-            <a:endParaRPr lang="en-US" dirty="0">
-              <a:latin typeface="Times New Roman" panose="02020603050405020304" charset="0"/>
-              <a:cs typeface="Times New Roman" panose="02020603050405020304" charset="0"/>
-            </a:endParaRPr>
-          </a:p>
-          <a:p>
-            <a:r>
-              <a:rPr lang="en-US" dirty="0">
-                <a:latin typeface="Times New Roman" panose="02020603050405020304" charset="0"/>
-                <a:cs typeface="Times New Roman" panose="02020603050405020304" charset="0"/>
-              </a:rPr>
-              <a:t>Offline Viewing</a:t>
-            </a:r>
-            <a:endParaRPr lang="en-US" dirty="0">
-              <a:latin typeface="Times New Roman" panose="02020603050405020304" charset="0"/>
-              <a:cs typeface="Times New Roman" panose="02020603050405020304" charset="0"/>
-            </a:endParaRPr>
-          </a:p>
-        </p:txBody>
-      </p:sp>
-      <p:sp>
-        <p:nvSpPr>
-          <p:cNvPr id="5" name="Slide Number Placeholder 4"/>
-          <p:cNvSpPr>
-            <a:spLocks noGrp="1"/>
-          </p:cNvSpPr>
-          <p:nvPr>
-            <p:ph type="sldNum" sz="quarter" idx="15"/>
-          </p:nvPr>
-        </p:nvSpPr>
-        <p:spPr/>
-        <p:txBody>
-          <a:bodyPr/>
-          <a:lstStyle/>
-          <a:p>
-            <a:r>
-              <a:rPr lang="en-US" dirty="0"/>
-              <a:t>8</a:t>
-            </a:r>
-            <a:endParaRPr lang="en-US" dirty="0"/>
-          </a:p>
-        </p:txBody>
-      </p:sp>
-      <p:sp>
-        <p:nvSpPr>
-          <p:cNvPr id="6" name="Footer Placeholder 5"/>
-          <p:cNvSpPr>
-            <a:spLocks noGrp="1"/>
-          </p:cNvSpPr>
-          <p:nvPr>
-            <p:ph type="ftr" sz="quarter" idx="16"/>
-          </p:nvPr>
-        </p:nvSpPr>
-        <p:spPr/>
-        <p:txBody>
-          <a:bodyPr/>
-          <a:lstStyle/>
-          <a:p>
-            <a:r>
-              <a:rPr lang="en-US"/>
-              <a:t>1</a:t>
-            </a:r>
-            <a:endParaRPr lang="en-US"/>
-          </a:p>
-        </p:txBody>
-      </p:sp>
-    </p:spTree>
-  </p:cSld>
-  <p:clrMapOvr>
-    <a:masterClrMapping/>
-  </p:clrMapOvr>
-</p:sld>
-</file>
-
-<file path=ppt/slides/slide11.xml><?xml version="1.0" encoding="utf-8"?>
-<p:sld xmlns:a="http://schemas.openxmlformats.org/drawingml/2006/main" xmlns:r="http://schemas.openxmlformats.org/officeDocument/2006/relationships" xmlns:p="http://schemas.openxmlformats.org/presentationml/2006/main">
-  <p:cSld>
-    <p:spTree>
-      <p:nvGrpSpPr>
-        <p:cNvPr id="1" name=""/>
-        <p:cNvGrpSpPr/>
-        <p:nvPr/>
-      </p:nvGrpSpPr>
-      <p:grpSpPr>
-        <a:xfrm>
-          <a:off x="0" y="0"/>
-          <a:ext cx="0" cy="0"/>
-          <a:chOff x="0" y="0"/>
-          <a:chExt cx="0" cy="0"/>
-        </a:xfrm>
-      </p:grpSpPr>
-      <p:sp>
-        <p:nvSpPr>
-          <p:cNvPr id="6" name="Title 5"/>
-          <p:cNvSpPr>
-            <a:spLocks noGrp="1"/>
-          </p:cNvSpPr>
-          <p:nvPr>
-            <p:ph type="title"/>
-          </p:nvPr>
-        </p:nvSpPr>
-        <p:spPr>
-          <a:xfrm>
-            <a:off x="457200" y="2971800"/>
-            <a:ext cx="7467600" cy="1143000"/>
-          </a:xfrm>
-        </p:spPr>
-        <p:txBody>
-          <a:bodyPr/>
-          <a:lstStyle/>
-          <a:p>
-            <a:pPr algn="ctr"/>
-            <a:r>
-              <a:rPr lang="en-US" dirty="0">
-                <a:latin typeface="Times New Roman" panose="02020603050405020304" charset="0"/>
-                <a:cs typeface="Times New Roman" panose="02020603050405020304" charset="0"/>
-              </a:rPr>
-              <a:t>THANK YOU</a:t>
-            </a:r>
-            <a:br>
-              <a:rPr lang="en-US" dirty="0">
-                <a:latin typeface="Times New Roman" panose="02020603050405020304" charset="0"/>
-                <a:cs typeface="Times New Roman" panose="02020603050405020304" charset="0"/>
-              </a:rPr>
-            </a:br>
-            <a:r>
-              <a:rPr lang="en-US" dirty="0">
-                <a:latin typeface="Times New Roman" panose="02020603050405020304" charset="0"/>
-                <a:cs typeface="Times New Roman" panose="02020603050405020304" charset="0"/>
-              </a:rPr>
-              <a:t>Any Queries?</a:t>
-            </a:r>
-            <a:endParaRPr lang="en-US" dirty="0">
-              <a:latin typeface="Times New Roman" panose="02020603050405020304" charset="0"/>
-              <a:cs typeface="Times New Roman" panose="02020603050405020304" charset="0"/>
-            </a:endParaRPr>
-          </a:p>
-        </p:txBody>
-      </p:sp>
-      <p:sp>
-        <p:nvSpPr>
-          <p:cNvPr id="4" name="Slide Number Placeholder 3"/>
-          <p:cNvSpPr>
-            <a:spLocks noGrp="1"/>
-          </p:cNvSpPr>
-          <p:nvPr>
-            <p:ph type="sldNum" sz="quarter" idx="11"/>
-          </p:nvPr>
-        </p:nvSpPr>
-        <p:spPr/>
-        <p:txBody>
-          <a:bodyPr/>
-          <a:lstStyle/>
-          <a:p>
-            <a:fld id="{A9CBFD58-032B-4D4E-9A90-15534290D568}" type="slidenum">
-              <a:rPr lang="en-US" smtClean="0"/>
-            </a:fld>
-            <a:endParaRPr lang="en-US"/>
-          </a:p>
-        </p:txBody>
-      </p:sp>
-      <p:sp>
-        <p:nvSpPr>
-          <p:cNvPr id="5" name="Footer Placeholder 4"/>
-          <p:cNvSpPr>
-            <a:spLocks noGrp="1"/>
-          </p:cNvSpPr>
-          <p:nvPr>
-            <p:ph type="ftr" sz="quarter" idx="12"/>
-          </p:nvPr>
-        </p:nvSpPr>
-        <p:spPr/>
-        <p:txBody>
-          <a:bodyPr/>
-          <a:lstStyle/>
-          <a:p>
-            <a:r>
-              <a:rPr lang="en-US"/>
-              <a:t>1</a:t>
-            </a:r>
-            <a:endParaRPr lang="en-US"/>
-          </a:p>
-        </p:txBody>
-      </p:sp>
-    </p:spTree>
-  </p:cSld>
-  <p:clrMapOvr>
-    <a:masterClrMapping/>
-  </p:clrMapOvr>
-</p:sld>
-</file>
-
 <file path=ppt/slides/slide2.xml><?xml version="1.0" encoding="utf-8"?>
 <p:sld xmlns:a="http://schemas.openxmlformats.org/drawingml/2006/main" xmlns:r="http://schemas.openxmlformats.org/officeDocument/2006/relationships" xmlns:p="http://schemas.openxmlformats.org/presentationml/2006/main">
   <p:cSld>
@@ -6529,155 +6234,115 @@
           </a:p>
         </p:txBody>
       </p:sp>
+      <p:sp>
+        <p:nvSpPr>
+          <p:cNvPr id="5" name="Slide Number Placeholder 4"/>
+          <p:cNvSpPr>
+            <a:spLocks noGrp="1"/>
+          </p:cNvSpPr>
+          <p:nvPr>
+            <p:ph type="sldNum" sz="quarter" idx="15"/>
+          </p:nvPr>
+        </p:nvSpPr>
+        <p:spPr/>
+        <p:txBody>
+          <a:bodyPr/>
+          <a:lstStyle/>
+          <a:p>
+            <a:r>
+              <a:rPr lang="en-US" dirty="0"/>
+              <a:t>4</a:t>
+            </a:r>
+            <a:endParaRPr lang="en-US" dirty="0"/>
+          </a:p>
+        </p:txBody>
+      </p:sp>
+      <p:sp>
+        <p:nvSpPr>
+          <p:cNvPr id="6" name="Footer Placeholder 5"/>
+          <p:cNvSpPr>
+            <a:spLocks noGrp="1"/>
+          </p:cNvSpPr>
+          <p:nvPr>
+            <p:ph type="ftr" sz="quarter" idx="16"/>
+          </p:nvPr>
+        </p:nvSpPr>
+        <p:spPr/>
+        <p:txBody>
+          <a:bodyPr/>
+          <a:lstStyle/>
+          <a:p>
+            <a:r>
+              <a:rPr lang="en-US"/>
+              <a:t>1</a:t>
+            </a:r>
+            <a:endParaRPr lang="en-US"/>
+          </a:p>
+        </p:txBody>
+      </p:sp>
+      <p:sp>
+        <p:nvSpPr>
+          <p:cNvPr id="3" name="TextBox 2"/>
+          <p:cNvSpPr txBox="1"/>
+          <p:nvPr/>
+        </p:nvSpPr>
+        <p:spPr>
+          <a:xfrm>
+            <a:off x="1828800" y="5257800"/>
+            <a:ext cx="5029200" cy="368300"/>
+          </a:xfrm>
+          <a:prstGeom prst="rect">
+            <a:avLst/>
+          </a:prstGeom>
+          <a:noFill/>
+        </p:spPr>
+        <p:txBody>
+          <a:bodyPr wrap="square" rtlCol="0">
+            <a:spAutoFit/>
+          </a:bodyPr>
+          <a:lstStyle/>
+          <a:p>
+            <a:pPr algn="ctr"/>
+            <a:r>
+              <a:rPr lang="en-US" dirty="0">
+                <a:latin typeface="Times New Roman" panose="02020603050405020304" charset="0"/>
+                <a:cs typeface="Times New Roman" panose="02020603050405020304" charset="0"/>
+              </a:rPr>
+              <a:t>Fig 1: WaterFall Model</a:t>
+            </a:r>
+            <a:endParaRPr lang="en-US" dirty="0">
+              <a:latin typeface="Times New Roman" panose="02020603050405020304" charset="0"/>
+              <a:cs typeface="Times New Roman" panose="02020603050405020304" charset="0"/>
+            </a:endParaRPr>
+          </a:p>
+        </p:txBody>
+      </p:sp>
       <p:pic>
         <p:nvPicPr>
-          <p:cNvPr id="1026" name="Picture 2"/>
+          <p:cNvPr id="7" name="Content Placeholder 6" descr="WaterFallModel"/>
           <p:cNvPicPr>
-            <a:picLocks noGrp="1" noChangeAspect="1" noChangeArrowheads="1"/>
+            <a:picLocks noChangeAspect="1"/>
           </p:cNvPicPr>
           <p:nvPr>
             <p:ph sz="quarter" idx="1"/>
           </p:nvPr>
         </p:nvPicPr>
         <p:blipFill>
-          <a:blip r:embed="rId1">
-            <a:extLst>
-              <a:ext uri="{28A0092B-C50C-407E-A947-70E740481C1C}">
-                <a14:useLocalDpi xmlns:a14="http://schemas.microsoft.com/office/drawing/2010/main" val="0"/>
-              </a:ext>
-            </a:extLst>
-          </a:blip>
-          <a:srcRect/>
+          <a:blip r:embed="rId1"/>
           <a:stretch>
             <a:fillRect/>
           </a:stretch>
         </p:blipFill>
-        <p:spPr bwMode="auto">
-          <a:xfrm>
-            <a:off x="1438417" y="2157874"/>
-            <a:ext cx="5505165" cy="2542252"/>
+        <p:spPr>
+          <a:xfrm>
+            <a:off x="1405890" y="1905000"/>
+            <a:ext cx="5569585" cy="3233420"/>
           </a:xfrm>
           <a:prstGeom prst="rect">
             <a:avLst/>
           </a:prstGeom>
-          <a:noFill/>
-          <a:ln>
-            <a:noFill/>
-          </a:ln>
-          <a:effectLst/>
-          <a:extLst>
-            <a:ext uri="{909E8E84-426E-40DD-AFC4-6F175D3DCCD1}">
-              <a14:hiddenFill xmlns:a14="http://schemas.microsoft.com/office/drawing/2010/main">
-                <a:solidFill>
-                  <a:schemeClr val="accent1"/>
-                </a:solidFill>
-              </a14:hiddenFill>
-            </a:ext>
-            <a:ext uri="{91240B29-F687-4F45-9708-019B960494DF}">
-              <a14:hiddenLine xmlns:a14="http://schemas.microsoft.com/office/drawing/2010/main" w="9525">
-                <a:solidFill>
-                  <a:schemeClr val="tx1"/>
-                </a:solidFill>
-                <a:miter lim="800000"/>
-                <a:headEnd/>
-                <a:tailEnd/>
-              </a14:hiddenLine>
-            </a:ext>
-            <a:ext uri="{AF507438-7753-43E0-B8FC-AC1667EBCBE1}">
-              <a14:hiddenEffects xmlns:a14="http://schemas.microsoft.com/office/drawing/2010/main">
-                <a:effectLst>
-                  <a:outerShdw dist="35921" dir="2700000" algn="ctr" rotWithShape="0">
-                    <a:schemeClr val="bg2"/>
-                  </a:outerShdw>
-                </a:effectLst>
-              </a14:hiddenEffects>
-            </a:ext>
-          </a:extLst>
         </p:spPr>
       </p:pic>
-      <p:sp>
-        <p:nvSpPr>
-          <p:cNvPr id="5" name="Slide Number Placeholder 4"/>
-          <p:cNvSpPr>
-            <a:spLocks noGrp="1"/>
-          </p:cNvSpPr>
-          <p:nvPr>
-            <p:ph type="sldNum" sz="quarter" idx="15"/>
-          </p:nvPr>
-        </p:nvSpPr>
-        <p:spPr/>
-        <p:txBody>
-          <a:bodyPr/>
-          <a:lstStyle/>
-          <a:p>
-            <a:r>
-              <a:rPr lang="en-US" dirty="0"/>
-              <a:t>4</a:t>
-            </a:r>
-            <a:endParaRPr lang="en-US" dirty="0"/>
-          </a:p>
-        </p:txBody>
-      </p:sp>
-      <p:sp>
-        <p:nvSpPr>
-          <p:cNvPr id="6" name="Footer Placeholder 5"/>
-          <p:cNvSpPr>
-            <a:spLocks noGrp="1"/>
-          </p:cNvSpPr>
-          <p:nvPr>
-            <p:ph type="ftr" sz="quarter" idx="16"/>
-          </p:nvPr>
-        </p:nvSpPr>
-        <p:spPr/>
-        <p:txBody>
-          <a:bodyPr/>
-          <a:lstStyle/>
-          <a:p>
-            <a:r>
-              <a:rPr lang="en-US"/>
-              <a:t>1</a:t>
-            </a:r>
-            <a:endParaRPr lang="en-US"/>
-          </a:p>
-        </p:txBody>
-      </p:sp>
-      <p:sp>
-        <p:nvSpPr>
-          <p:cNvPr id="3" name="TextBox 2"/>
-          <p:cNvSpPr txBox="1"/>
-          <p:nvPr/>
-        </p:nvSpPr>
-        <p:spPr>
-          <a:xfrm>
-            <a:off x="1828800" y="5257800"/>
-            <a:ext cx="5029200" cy="368300"/>
-          </a:xfrm>
-          <a:prstGeom prst="rect">
-            <a:avLst/>
-          </a:prstGeom>
-          <a:noFill/>
-        </p:spPr>
-        <p:txBody>
-          <a:bodyPr wrap="square" rtlCol="0">
-            <a:spAutoFit/>
-          </a:bodyPr>
-          <a:lstStyle/>
-          <a:p>
-            <a:pPr algn="ctr"/>
-            <a:r>
-              <a:rPr lang="en-US" dirty="0">
-                <a:latin typeface="Times New Roman" panose="02020603050405020304" charset="0"/>
-                <a:cs typeface="Times New Roman" panose="02020603050405020304" charset="0"/>
-              </a:rPr>
-              <a:t>Fig 1: Prototyping Model</a:t>
-            </a:r>
-            <a:endParaRPr lang="en-US" dirty="0">
-              <a:latin typeface="Times New Roman" panose="02020603050405020304" charset="0"/>
-              <a:cs typeface="Times New Roman" panose="02020603050405020304" charset="0"/>
-            </a:endParaRPr>
-          </a:p>
-        </p:txBody>
-      </p:sp>
     </p:spTree>
   </p:cSld>
   <p:clrMapOvr>
@@ -6695,17 +6360,10 @@
         <p:cNvGrpSpPr/>
         <p:nvPr/>
       </p:nvGrpSpPr>
-      <p:grpSpPr>
-        <a:xfrm>
-          <a:off x="0" y="0"/>
-          <a:ext cx="0" cy="0"/>
-          <a:chOff x="0" y="0"/>
-          <a:chExt cx="0" cy="0"/>
-        </a:xfrm>
-      </p:grpSpPr>
-      <p:sp>
-        <p:nvSpPr>
-          <p:cNvPr id="2" name="Title 1"/>
+      <p:grpSpPr/>
+      <p:sp>
+        <p:nvSpPr>
+          <p:cNvPr id="7" name="Title 6"/>
           <p:cNvSpPr>
             <a:spLocks noGrp="1"/>
           </p:cNvSpPr>
@@ -6716,16 +6374,21 @@
         <p:spPr/>
         <p:txBody>
           <a:bodyPr/>
-          <a:lstStyle/>
-          <a:p>
-            <a:r>
-              <a:rPr lang="en-US" dirty="0">
+          <a:p>
+            <a:r>
+              <a:rPr lang="en-US">
+                <a:solidFill>
+                  <a:schemeClr val="tx1"/>
+                </a:solidFill>
                 <a:latin typeface="Times New Roman" panose="02020603050405020304" charset="0"/>
                 <a:cs typeface="Times New Roman" panose="02020603050405020304" charset="0"/>
               </a:rPr>
-              <a:t>Use Case:</a:t>
-            </a:r>
-            <a:endParaRPr lang="en-US" dirty="0">
+              <a:t>Project Status </a:t>
+            </a:r>
+            <a:endParaRPr lang="en-US">
+              <a:solidFill>
+                <a:schemeClr val="tx1"/>
+              </a:solidFill>
               <a:latin typeface="Times New Roman" panose="02020603050405020304" charset="0"/>
               <a:cs typeface="Times New Roman" panose="02020603050405020304" charset="0"/>
             </a:endParaRPr>
@@ -6734,114 +6397,111 @@
       </p:sp>
       <p:sp>
         <p:nvSpPr>
-          <p:cNvPr id="4" name="Slide Number Placeholder 3"/>
-          <p:cNvSpPr>
-            <a:spLocks noGrp="1"/>
-          </p:cNvSpPr>
-          <p:nvPr>
-            <p:ph type="sldNum" sz="quarter" idx="11"/>
+          <p:cNvPr id="8" name="Content Placeholder 7"/>
+          <p:cNvSpPr>
+            <a:spLocks noGrp="1"/>
+          </p:cNvSpPr>
+          <p:nvPr>
+            <p:ph sz="quarter" idx="1"/>
           </p:nvPr>
         </p:nvSpPr>
         <p:spPr/>
         <p:txBody>
           <a:bodyPr/>
-          <a:lstStyle/>
-          <a:p>
-            <a:r>
-              <a:rPr lang="en-US" dirty="0"/>
-              <a:t>5</a:t>
-            </a:r>
-            <a:endParaRPr lang="en-US" dirty="0"/>
-          </a:p>
-        </p:txBody>
-      </p:sp>
-      <p:sp>
-        <p:nvSpPr>
-          <p:cNvPr id="5" name="Footer Placeholder 4"/>
-          <p:cNvSpPr>
-            <a:spLocks noGrp="1"/>
-          </p:cNvSpPr>
-          <p:nvPr>
-            <p:ph type="ftr" sz="quarter" idx="12"/>
-          </p:nvPr>
-        </p:nvSpPr>
-        <p:spPr/>
-        <p:txBody>
-          <a:bodyPr/>
-          <a:lstStyle/>
-          <a:p>
-            <a:r>
-              <a:rPr lang="en-US"/>
-              <a:t>1</a:t>
-            </a:r>
-            <a:endParaRPr lang="en-US"/>
-          </a:p>
-        </p:txBody>
-      </p:sp>
-      <p:pic>
-        <p:nvPicPr>
-          <p:cNvPr id="6" name="Picture 5"/>
-          <p:cNvPicPr>
-            <a:picLocks noChangeAspect="1"/>
-          </p:cNvPicPr>
-          <p:nvPr/>
-        </p:nvPicPr>
-        <p:blipFill>
-          <a:blip r:embed="rId1">
-            <a:extLst>
-              <a:ext uri="{28A0092B-C50C-407E-A947-70E740481C1C}">
-                <a14:useLocalDpi xmlns:a14="http://schemas.microsoft.com/office/drawing/2010/main" val="0"/>
-              </a:ext>
-            </a:extLst>
-          </a:blip>
-          <a:stretch>
-            <a:fillRect/>
-          </a:stretch>
-        </p:blipFill>
-        <p:spPr>
-          <a:xfrm>
-            <a:off x="2462212" y="1417638"/>
-            <a:ext cx="3457575" cy="4638675"/>
-          </a:xfrm>
-          <a:prstGeom prst="rect">
-            <a:avLst/>
-          </a:prstGeom>
-        </p:spPr>
-      </p:pic>
-      <p:sp>
-        <p:nvSpPr>
-          <p:cNvPr id="7" name="TextBox 6"/>
-          <p:cNvSpPr txBox="1"/>
-          <p:nvPr/>
-        </p:nvSpPr>
-        <p:spPr>
-          <a:xfrm>
-            <a:off x="1828800" y="6255258"/>
-            <a:ext cx="5181600" cy="368300"/>
-          </a:xfrm>
-          <a:prstGeom prst="rect">
-            <a:avLst/>
-          </a:prstGeom>
-          <a:noFill/>
-        </p:spPr>
-        <p:txBody>
-          <a:bodyPr wrap="square" rtlCol="0">
-            <a:spAutoFit/>
-          </a:bodyPr>
-          <a:lstStyle/>
-          <a:p>
-            <a:pPr algn="ctr"/>
-            <a:r>
-              <a:rPr lang="en-US" dirty="0">
+          <a:p>
+            <a:r>
+              <a:rPr lang="en-US">
                 <a:latin typeface="Times New Roman" panose="02020603050405020304" charset="0"/>
                 <a:cs typeface="Times New Roman" panose="02020603050405020304" charset="0"/>
               </a:rPr>
-              <a:t>Fig 2: Use Case Diagram of MovieMagic</a:t>
-            </a:r>
-            <a:endParaRPr lang="en-US" dirty="0">
+              <a:t>Login Page</a:t>
+            </a:r>
+            <a:endParaRPr lang="en-US">
               <a:latin typeface="Times New Roman" panose="02020603050405020304" charset="0"/>
               <a:cs typeface="Times New Roman" panose="02020603050405020304" charset="0"/>
             </a:endParaRPr>
+          </a:p>
+          <a:p>
+            <a:r>
+              <a:rPr lang="en-US">
+                <a:latin typeface="Times New Roman" panose="02020603050405020304" charset="0"/>
+                <a:cs typeface="Times New Roman" panose="02020603050405020304" charset="0"/>
+              </a:rPr>
+              <a:t>Admin Panel</a:t>
+            </a:r>
+            <a:endParaRPr lang="en-US">
+              <a:latin typeface="Times New Roman" panose="02020603050405020304" charset="0"/>
+              <a:cs typeface="Times New Roman" panose="02020603050405020304" charset="0"/>
+            </a:endParaRPr>
+          </a:p>
+          <a:p>
+            <a:r>
+              <a:rPr lang="en-US">
+                <a:latin typeface="Times New Roman" panose="02020603050405020304" charset="0"/>
+                <a:cs typeface="Times New Roman" panose="02020603050405020304" charset="0"/>
+              </a:rPr>
+              <a:t>Home Page </a:t>
+            </a:r>
+            <a:endParaRPr lang="en-US">
+              <a:latin typeface="Times New Roman" panose="02020603050405020304" charset="0"/>
+              <a:cs typeface="Times New Roman" panose="02020603050405020304" charset="0"/>
+            </a:endParaRPr>
+          </a:p>
+          <a:p>
+            <a:r>
+              <a:rPr lang="en-US">
+                <a:latin typeface="Times New Roman" panose="02020603050405020304" charset="0"/>
+                <a:cs typeface="Times New Roman" panose="02020603050405020304" charset="0"/>
+              </a:rPr>
+              <a:t>About Page</a:t>
+            </a:r>
+            <a:endParaRPr lang="en-US">
+              <a:latin typeface="Times New Roman" panose="02020603050405020304" charset="0"/>
+              <a:cs typeface="Times New Roman" panose="02020603050405020304" charset="0"/>
+            </a:endParaRPr>
+          </a:p>
+        </p:txBody>
+      </p:sp>
+      <p:sp>
+        <p:nvSpPr>
+          <p:cNvPr id="3" name="Slide Number Placeholder 2"/>
+          <p:cNvSpPr>
+            <a:spLocks noGrp="1"/>
+          </p:cNvSpPr>
+          <p:nvPr>
+            <p:ph type="sldNum" sz="quarter" idx="15"/>
+          </p:nvPr>
+        </p:nvSpPr>
+        <p:spPr/>
+        <p:txBody>
+          <a:bodyPr/>
+          <a:p>
+            <a:fld id="{A9CBFD58-032B-4D4E-9A90-15534290D568}" type="slidenum">
+              <a:rPr lang="en-US" smtClean="0"/>
+            </a:fld>
+            <a:endParaRPr lang="en-US"/>
+          </a:p>
+        </p:txBody>
+      </p:sp>
+      <p:sp>
+        <p:nvSpPr>
+          <p:cNvPr id="4" name="Footer Placeholder 3"/>
+          <p:cNvSpPr>
+            <a:spLocks noGrp="1"/>
+          </p:cNvSpPr>
+          <p:nvPr>
+            <p:ph type="ftr" sz="quarter" idx="16"/>
+          </p:nvPr>
+        </p:nvSpPr>
+        <p:spPr/>
+        <p:txBody>
+          <a:bodyPr/>
+          <a:p>
+            <a:r>
+              <a:rPr lang="en-US"/>
+              <a:t>1</a:t>
+            </a:r>
+            <a:endParaRPr lang="en-US"/>
           </a:p>
         </p:txBody>
       </p:sp>
@@ -6887,162 +6547,135 @@
           <a:p>
             <a:r>
               <a:rPr lang="en-US" dirty="0">
+                <a:solidFill>
+                  <a:schemeClr val="tx1"/>
+                </a:solidFill>
                 <a:latin typeface="Times New Roman" panose="02020603050405020304" charset="0"/>
                 <a:cs typeface="Times New Roman" panose="02020603050405020304" charset="0"/>
               </a:rPr>
-              <a:t>Architectural Diagram:</a:t>
+              <a:t>Future Work</a:t>
+            </a:r>
+            <a:endParaRPr lang="en-US" dirty="0">
+              <a:solidFill>
+                <a:schemeClr val="tx1"/>
+              </a:solidFill>
+              <a:latin typeface="Times New Roman" panose="02020603050405020304" charset="0"/>
+              <a:cs typeface="Times New Roman" panose="02020603050405020304" charset="0"/>
+            </a:endParaRPr>
+          </a:p>
+        </p:txBody>
+      </p:sp>
+      <p:sp>
+        <p:nvSpPr>
+          <p:cNvPr id="3" name="Content Placeholder 2"/>
+          <p:cNvSpPr>
+            <a:spLocks noGrp="1"/>
+          </p:cNvSpPr>
+          <p:nvPr>
+            <p:ph sz="quarter" idx="1"/>
+          </p:nvPr>
+        </p:nvSpPr>
+        <p:spPr/>
+        <p:txBody>
+          <a:bodyPr/>
+          <a:lstStyle/>
+          <a:p>
+            <a:r>
+              <a:rPr lang="en-US" dirty="0">
+                <a:latin typeface="Times New Roman" panose="02020603050405020304" charset="0"/>
+                <a:cs typeface="Times New Roman" panose="02020603050405020304" charset="0"/>
+              </a:rPr>
+              <a:t>Review Page</a:t>
             </a:r>
             <a:endParaRPr lang="en-US" dirty="0">
               <a:latin typeface="Times New Roman" panose="02020603050405020304" charset="0"/>
               <a:cs typeface="Times New Roman" panose="02020603050405020304" charset="0"/>
             </a:endParaRPr>
           </a:p>
-        </p:txBody>
-      </p:sp>
-      <p:sp>
-        <p:nvSpPr>
-          <p:cNvPr id="3" name="Content Placeholder 2"/>
-          <p:cNvSpPr>
-            <a:spLocks noGrp="1"/>
-          </p:cNvSpPr>
-          <p:nvPr>
-            <p:ph sz="quarter" idx="1"/>
-          </p:nvPr>
-        </p:nvSpPr>
-        <p:spPr/>
-        <p:txBody>
-          <a:bodyPr/>
-          <a:lstStyle/>
-          <a:p>
-            <a:pPr marL="0" indent="0">
-              <a:buNone/>
-            </a:pPr>
-            <a:endParaRPr lang="en-US" dirty="0"/>
-          </a:p>
-          <a:p>
-            <a:pPr marL="0" indent="0">
-              <a:buNone/>
-            </a:pPr>
-            <a:endParaRPr lang="en-US" dirty="0"/>
-          </a:p>
-          <a:p>
-            <a:pPr marL="0" indent="0">
-              <a:buNone/>
-            </a:pPr>
-            <a:endParaRPr lang="en-US" dirty="0"/>
-          </a:p>
-        </p:txBody>
-      </p:sp>
-      <p:pic>
-        <p:nvPicPr>
-          <p:cNvPr id="4" name="Picture 3"/>
-          <p:cNvPicPr>
-            <a:picLocks noChangeAspect="1"/>
-          </p:cNvPicPr>
-          <p:nvPr/>
-        </p:nvPicPr>
-        <p:blipFill>
-          <a:blip r:embed="rId1">
-            <a:extLst>
-              <a:ext uri="{28A0092B-C50C-407E-A947-70E740481C1C}">
-                <a14:useLocalDpi xmlns:a14="http://schemas.microsoft.com/office/drawing/2010/main" val="0"/>
-              </a:ext>
-            </a:extLst>
-          </a:blip>
-          <a:stretch>
-            <a:fillRect/>
-          </a:stretch>
-        </p:blipFill>
-        <p:spPr>
-          <a:xfrm>
-            <a:off x="914400" y="2057400"/>
-            <a:ext cx="7334083" cy="3614738"/>
-          </a:xfrm>
-          <a:prstGeom prst="rect">
-            <a:avLst/>
-          </a:prstGeom>
-        </p:spPr>
-      </p:pic>
-      <p:sp>
-        <p:nvSpPr>
-          <p:cNvPr id="6" name="Slide Number Placeholder 5"/>
-          <p:cNvSpPr>
-            <a:spLocks noGrp="1"/>
-          </p:cNvSpPr>
-          <p:nvPr>
-            <p:ph type="sldNum" sz="quarter" idx="15"/>
-          </p:nvPr>
-        </p:nvSpPr>
-        <p:spPr/>
-        <p:txBody>
-          <a:bodyPr/>
-          <a:lstStyle/>
-          <a:p>
-            <a:r>
-              <a:rPr lang="en-US" dirty="0"/>
-              <a:t>6</a:t>
-            </a:r>
-            <a:endParaRPr lang="en-US" dirty="0"/>
-          </a:p>
-        </p:txBody>
-      </p:sp>
-      <p:sp>
-        <p:nvSpPr>
-          <p:cNvPr id="7" name="Footer Placeholder 6"/>
-          <p:cNvSpPr>
-            <a:spLocks noGrp="1"/>
-          </p:cNvSpPr>
-          <p:nvPr>
-            <p:ph type="ftr" sz="quarter" idx="16"/>
-          </p:nvPr>
-        </p:nvSpPr>
-        <p:spPr/>
-        <p:txBody>
-          <a:bodyPr/>
-          <a:lstStyle/>
-          <a:p>
-            <a:r>
-              <a:rPr lang="en-US"/>
-              <a:t>1</a:t>
-            </a:r>
-            <a:endParaRPr lang="en-US"/>
-          </a:p>
-        </p:txBody>
-      </p:sp>
-      <p:sp>
-        <p:nvSpPr>
-          <p:cNvPr id="5" name="TextBox 4"/>
-          <p:cNvSpPr txBox="1"/>
-          <p:nvPr/>
-        </p:nvSpPr>
-        <p:spPr>
-          <a:xfrm>
-            <a:off x="1562100" y="5852319"/>
-            <a:ext cx="5257800" cy="368300"/>
-          </a:xfrm>
-          <a:prstGeom prst="rect">
-            <a:avLst/>
-          </a:prstGeom>
-          <a:noFill/>
-        </p:spPr>
-        <p:txBody>
-          <a:bodyPr wrap="square" rtlCol="0">
-            <a:spAutoFit/>
-          </a:bodyPr>
-          <a:lstStyle/>
-          <a:p>
-            <a:pPr algn="ctr"/>
+          <a:p>
             <a:r>
               <a:rPr lang="en-US" dirty="0">
                 <a:latin typeface="Times New Roman" panose="02020603050405020304" charset="0"/>
                 <a:cs typeface="Times New Roman" panose="02020603050405020304" charset="0"/>
               </a:rPr>
-              <a:t>Fig 3: Architectural Diagram of MovieMagic</a:t>
+              <a:t>Video Playing Page</a:t>
             </a:r>
             <a:endParaRPr lang="en-US" dirty="0">
               <a:latin typeface="Times New Roman" panose="02020603050405020304" charset="0"/>
               <a:cs typeface="Times New Roman" panose="02020603050405020304" charset="0"/>
             </a:endParaRPr>
+          </a:p>
+          <a:p>
+            <a:r>
+              <a:rPr lang="en-US" dirty="0">
+                <a:latin typeface="Times New Roman" panose="02020603050405020304" charset="0"/>
+                <a:cs typeface="Times New Roman" panose="02020603050405020304" charset="0"/>
+              </a:rPr>
+              <a:t>Personal Recommendations</a:t>
+            </a:r>
+            <a:endParaRPr lang="en-US" dirty="0">
+              <a:latin typeface="Times New Roman" panose="02020603050405020304" charset="0"/>
+              <a:cs typeface="Times New Roman" panose="02020603050405020304" charset="0"/>
+            </a:endParaRPr>
+          </a:p>
+          <a:p>
+            <a:r>
+              <a:rPr lang="en-US" dirty="0">
+                <a:latin typeface="Times New Roman" panose="02020603050405020304" charset="0"/>
+                <a:cs typeface="Times New Roman" panose="02020603050405020304" charset="0"/>
+              </a:rPr>
+              <a:t>Offline Viewing</a:t>
+            </a:r>
+            <a:endParaRPr lang="en-US" dirty="0">
+              <a:latin typeface="Times New Roman" panose="02020603050405020304" charset="0"/>
+              <a:cs typeface="Times New Roman" panose="02020603050405020304" charset="0"/>
+            </a:endParaRPr>
+          </a:p>
+        </p:txBody>
+      </p:sp>
+      <p:sp>
+        <p:nvSpPr>
+          <p:cNvPr id="5" name="Slide Number Placeholder 4"/>
+          <p:cNvSpPr>
+            <a:spLocks noGrp="1"/>
+          </p:cNvSpPr>
+          <p:nvPr>
+            <p:ph type="sldNum" sz="quarter" idx="15"/>
+          </p:nvPr>
+        </p:nvSpPr>
+        <p:spPr/>
+        <p:txBody>
+          <a:bodyPr/>
+          <a:lstStyle/>
+          <a:p>
+            <a:r>
+              <a:rPr lang="en-US" dirty="0"/>
+              <a:t>8</a:t>
+            </a:r>
+            <a:endParaRPr lang="en-US" dirty="0"/>
+          </a:p>
+        </p:txBody>
+      </p:sp>
+      <p:sp>
+        <p:nvSpPr>
+          <p:cNvPr id="6" name="Footer Placeholder 5"/>
+          <p:cNvSpPr>
+            <a:spLocks noGrp="1"/>
+          </p:cNvSpPr>
+          <p:nvPr>
+            <p:ph type="ftr" sz="quarter" idx="16"/>
+          </p:nvPr>
+        </p:nvSpPr>
+        <p:spPr/>
+        <p:txBody>
+          <a:bodyPr/>
+          <a:lstStyle/>
+          <a:p>
+            <a:r>
+              <a:rPr lang="en-US"/>
+              <a:t>1</a:t>
+            </a:r>
+            <a:endParaRPr lang="en-US"/>
           </a:p>
         </p:txBody>
       </p:sp>
@@ -7073,7 +6706,7 @@
       </p:grpSpPr>
       <p:sp>
         <p:nvSpPr>
-          <p:cNvPr id="2" name="Title 1"/>
+          <p:cNvPr id="6" name="Title 5"/>
           <p:cNvSpPr>
             <a:spLocks noGrp="1"/>
           </p:cNvSpPr>
@@ -7081,17 +6714,36 @@
             <p:ph type="title"/>
           </p:nvPr>
         </p:nvSpPr>
-        <p:spPr/>
+        <p:spPr>
+          <a:xfrm>
+            <a:off x="457200" y="2971800"/>
+            <a:ext cx="7467600" cy="1143000"/>
+          </a:xfrm>
+        </p:spPr>
         <p:txBody>
           <a:bodyPr/>
           <a:lstStyle/>
           <a:p>
+            <a:pPr algn="ctr"/>
             <a:r>
               <a:rPr lang="en-US" dirty="0">
                 <a:latin typeface="Times New Roman" panose="02020603050405020304" charset="0"/>
                 <a:cs typeface="Times New Roman" panose="02020603050405020304" charset="0"/>
               </a:rPr>
-              <a:t>Gantt Chart:</a:t>
+              <a:t>THANK YOU</a:t>
+            </a:r>
+            <a:br>
+              <a:rPr lang="en-US" dirty="0">
+                <a:latin typeface="Times New Roman" panose="02020603050405020304" charset="0"/>
+                <a:cs typeface="Times New Roman" panose="02020603050405020304" charset="0"/>
+              </a:rPr>
+            </a:br>
+            <a:r>
+              <a:rPr lang="en-US" dirty="0">
+                <a:latin typeface="Times New Roman" panose="02020603050405020304" charset="0"/>
+                <a:cs typeface="Times New Roman" panose="02020603050405020304" charset="0"/>
+              </a:rPr>
+              <a:t>Any Queries?</a:t>
             </a:r>
             <a:endParaRPr lang="en-US" dirty="0">
               <a:latin typeface="Times New Roman" panose="02020603050405020304" charset="0"/>
@@ -7115,237 +6767,6 @@
           <a:bodyPr/>
           <a:lstStyle/>
           <a:p>
-            <a:r>
-              <a:rPr lang="en-US" dirty="0"/>
-              <a:t>7</a:t>
-            </a:r>
-            <a:endParaRPr lang="en-US" dirty="0"/>
-          </a:p>
-        </p:txBody>
-      </p:sp>
-      <p:sp>
-        <p:nvSpPr>
-          <p:cNvPr id="5" name="Footer Placeholder 4"/>
-          <p:cNvSpPr>
-            <a:spLocks noGrp="1"/>
-          </p:cNvSpPr>
-          <p:nvPr>
-            <p:ph type="ftr" sz="quarter" idx="12"/>
-          </p:nvPr>
-        </p:nvSpPr>
-        <p:spPr/>
-        <p:txBody>
-          <a:bodyPr/>
-          <a:lstStyle/>
-          <a:p>
-            <a:r>
-              <a:rPr lang="en-US"/>
-              <a:t>1</a:t>
-            </a:r>
-            <a:endParaRPr lang="en-US"/>
-          </a:p>
-        </p:txBody>
-      </p:sp>
-      <p:pic>
-        <p:nvPicPr>
-          <p:cNvPr id="6" name="Picture 5"/>
-          <p:cNvPicPr>
-            <a:picLocks noChangeAspect="1"/>
-          </p:cNvPicPr>
-          <p:nvPr/>
-        </p:nvPicPr>
-        <p:blipFill>
-          <a:blip r:embed="rId1">
-            <a:extLst>
-              <a:ext uri="{28A0092B-C50C-407E-A947-70E740481C1C}">
-                <a14:useLocalDpi xmlns:a14="http://schemas.microsoft.com/office/drawing/2010/main" val="0"/>
-              </a:ext>
-            </a:extLst>
-          </a:blip>
-          <a:stretch>
-            <a:fillRect/>
-          </a:stretch>
-        </p:blipFill>
-        <p:spPr>
-          <a:xfrm>
-            <a:off x="814720" y="1576970"/>
-            <a:ext cx="7505700" cy="3943350"/>
-          </a:xfrm>
-          <a:prstGeom prst="rect">
-            <a:avLst/>
-          </a:prstGeom>
-        </p:spPr>
-      </p:pic>
-      <p:sp>
-        <p:nvSpPr>
-          <p:cNvPr id="7" name="TextBox 6"/>
-          <p:cNvSpPr txBox="1"/>
-          <p:nvPr/>
-        </p:nvSpPr>
-        <p:spPr>
-          <a:xfrm>
-            <a:off x="1981200" y="5682734"/>
-            <a:ext cx="5562600" cy="368300"/>
-          </a:xfrm>
-          <a:prstGeom prst="rect">
-            <a:avLst/>
-          </a:prstGeom>
-          <a:noFill/>
-        </p:spPr>
-        <p:txBody>
-          <a:bodyPr wrap="square" rtlCol="0">
-            <a:spAutoFit/>
-          </a:bodyPr>
-          <a:lstStyle/>
-          <a:p>
-            <a:pPr algn="ctr"/>
-            <a:r>
-              <a:rPr lang="en-US" dirty="0">
-                <a:latin typeface="Times New Roman" panose="02020603050405020304" charset="0"/>
-                <a:cs typeface="Times New Roman" panose="02020603050405020304" charset="0"/>
-              </a:rPr>
-              <a:t>Fig 4: Gantt Chart</a:t>
-            </a:r>
-            <a:endParaRPr lang="en-US" dirty="0">
-              <a:latin typeface="Times New Roman" panose="02020603050405020304" charset="0"/>
-              <a:cs typeface="Times New Roman" panose="02020603050405020304" charset="0"/>
-            </a:endParaRPr>
-          </a:p>
-        </p:txBody>
-      </p:sp>
-    </p:spTree>
-  </p:cSld>
-  <p:clrMapOvr>
-    <a:masterClrMapping/>
-  </p:clrMapOvr>
-</p:sld>
-</file>
-
-<file path=ppt/slides/slide9.xml><?xml version="1.0" encoding="utf-8"?>
-<p:sld xmlns:a="http://schemas.openxmlformats.org/drawingml/2006/main" xmlns:r="http://schemas.openxmlformats.org/officeDocument/2006/relationships" xmlns:p="http://schemas.openxmlformats.org/presentationml/2006/main">
-  <p:cSld>
-    <p:spTree>
-      <p:nvGrpSpPr>
-        <p:cNvPr id="1" name=""/>
-        <p:cNvGrpSpPr/>
-        <p:nvPr/>
-      </p:nvGrpSpPr>
-      <p:grpSpPr/>
-      <p:sp>
-        <p:nvSpPr>
-          <p:cNvPr id="7" name="Title 6"/>
-          <p:cNvSpPr>
-            <a:spLocks noGrp="1"/>
-          </p:cNvSpPr>
-          <p:nvPr>
-            <p:ph type="title"/>
-          </p:nvPr>
-        </p:nvSpPr>
-        <p:spPr/>
-        <p:txBody>
-          <a:bodyPr/>
-          <a:p>
-            <a:r>
-              <a:rPr lang="en-US">
-                <a:solidFill>
-                  <a:schemeClr val="tx1"/>
-                </a:solidFill>
-                <a:latin typeface="Times New Roman" panose="02020603050405020304" charset="0"/>
-                <a:cs typeface="Times New Roman" panose="02020603050405020304" charset="0"/>
-              </a:rPr>
-              <a:t>Project Status </a:t>
-            </a:r>
-            <a:endParaRPr lang="en-US">
-              <a:solidFill>
-                <a:schemeClr val="tx1"/>
-              </a:solidFill>
-              <a:latin typeface="Times New Roman" panose="02020603050405020304" charset="0"/>
-              <a:cs typeface="Times New Roman" panose="02020603050405020304" charset="0"/>
-            </a:endParaRPr>
-          </a:p>
-        </p:txBody>
-      </p:sp>
-      <p:sp>
-        <p:nvSpPr>
-          <p:cNvPr id="8" name="Content Placeholder 7"/>
-          <p:cNvSpPr>
-            <a:spLocks noGrp="1"/>
-          </p:cNvSpPr>
-          <p:nvPr>
-            <p:ph sz="quarter" idx="1"/>
-          </p:nvPr>
-        </p:nvSpPr>
-        <p:spPr/>
-        <p:txBody>
-          <a:bodyPr/>
-          <a:p>
-            <a:r>
-              <a:rPr lang="en-US">
-                <a:latin typeface="Times New Roman" panose="02020603050405020304" charset="0"/>
-                <a:cs typeface="Times New Roman" panose="02020603050405020304" charset="0"/>
-              </a:rPr>
-              <a:t>Login Page</a:t>
-            </a:r>
-            <a:endParaRPr lang="en-US">
-              <a:latin typeface="Times New Roman" panose="02020603050405020304" charset="0"/>
-              <a:cs typeface="Times New Roman" panose="02020603050405020304" charset="0"/>
-            </a:endParaRPr>
-          </a:p>
-          <a:p>
-            <a:r>
-              <a:rPr lang="en-US">
-                <a:latin typeface="Times New Roman" panose="02020603050405020304" charset="0"/>
-                <a:cs typeface="Times New Roman" panose="02020603050405020304" charset="0"/>
-              </a:rPr>
-              <a:t>Admin Panel</a:t>
-            </a:r>
-            <a:endParaRPr lang="en-US">
-              <a:latin typeface="Times New Roman" panose="02020603050405020304" charset="0"/>
-              <a:cs typeface="Times New Roman" panose="02020603050405020304" charset="0"/>
-            </a:endParaRPr>
-          </a:p>
-          <a:p>
-            <a:r>
-              <a:rPr lang="en-US">
-                <a:latin typeface="Times New Roman" panose="02020603050405020304" charset="0"/>
-                <a:cs typeface="Times New Roman" panose="02020603050405020304" charset="0"/>
-              </a:rPr>
-              <a:t>Home Page </a:t>
-            </a:r>
-            <a:endParaRPr lang="en-US">
-              <a:latin typeface="Times New Roman" panose="02020603050405020304" charset="0"/>
-              <a:cs typeface="Times New Roman" panose="02020603050405020304" charset="0"/>
-            </a:endParaRPr>
-          </a:p>
-          <a:p>
-            <a:r>
-              <a:rPr lang="en-US">
-                <a:latin typeface="Times New Roman" panose="02020603050405020304" charset="0"/>
-                <a:cs typeface="Times New Roman" panose="02020603050405020304" charset="0"/>
-              </a:rPr>
-              <a:t>About Page</a:t>
-            </a:r>
-            <a:endParaRPr lang="en-US">
-              <a:latin typeface="Times New Roman" panose="02020603050405020304" charset="0"/>
-              <a:cs typeface="Times New Roman" panose="02020603050405020304" charset="0"/>
-            </a:endParaRPr>
-          </a:p>
-        </p:txBody>
-      </p:sp>
-      <p:sp>
-        <p:nvSpPr>
-          <p:cNvPr id="3" name="Slide Number Placeholder 2"/>
-          <p:cNvSpPr>
-            <a:spLocks noGrp="1"/>
-          </p:cNvSpPr>
-          <p:nvPr>
-            <p:ph type="sldNum" sz="quarter" idx="15"/>
-          </p:nvPr>
-        </p:nvSpPr>
-        <p:spPr/>
-        <p:txBody>
-          <a:bodyPr/>
-          <a:p>
             <a:fld id="{A9CBFD58-032B-4D4E-9A90-15534290D568}" type="slidenum">
               <a:rPr lang="en-US" smtClean="0"/>
             </a:fld>
@@ -7355,17 +6776,18 @@
       </p:sp>
       <p:sp>
         <p:nvSpPr>
-          <p:cNvPr id="4" name="Footer Placeholder 3"/>
-          <p:cNvSpPr>
-            <a:spLocks noGrp="1"/>
-          </p:cNvSpPr>
-          <p:nvPr>
-            <p:ph type="ftr" sz="quarter" idx="16"/>
+          <p:cNvPr id="5" name="Footer Placeholder 4"/>
+          <p:cNvSpPr>
+            <a:spLocks noGrp="1"/>
+          </p:cNvSpPr>
+          <p:nvPr>
+            <p:ph type="ftr" sz="quarter" idx="12"/>
           </p:nvPr>
         </p:nvSpPr>
         <p:spPr/>
         <p:txBody>
           <a:bodyPr/>
+          <a:lstStyle/>
           <a:p>
             <a:r>
               <a:rPr lang="en-US"/>

</xml_diff>